<commit_message>
Update applied control demo page
</commit_message>
<xml_diff>
--- a/content/applied-controls-demo/images/Figures.pptx
+++ b/content/applied-controls-demo/images/Figures.pptx
@@ -7,6 +7,9 @@
   <p:sldIdLst>
     <p:sldId id="256" r:id="rId2"/>
     <p:sldId id="257" r:id="rId3"/>
+    <p:sldId id="258" r:id="rId4"/>
+    <p:sldId id="260" r:id="rId5"/>
+    <p:sldId id="259" r:id="rId6"/>
   </p:sldIdLst>
   <p:sldSz cx="12192000" cy="6858000"/>
   <p:notesSz cx="6858000" cy="9144000"/>
@@ -105,6 +108,11 @@
       </a:defRPr>
     </a:lvl9pPr>
   </p:defaultTextStyle>
+  <p:extLst>
+    <p:ext uri="{EFAFB233-063F-42B5-8137-9DF3F51BA10A}">
+      <p15:sldGuideLst xmlns:p15="http://schemas.microsoft.com/office/powerpoint/2012/main"/>
+    </p:ext>
+  </p:extLst>
 </p:presentation>
 </file>
 
@@ -269,7 +277,7 @@
             <a:fld id="{650E2452-111D-4323-B9CF-1B5500397756}" type="datetimeFigureOut">
               <a:rPr lang="en-US" smtClean="0"/>
               <a:pPr/>
-              <a:t>9/5/2023</a:t>
+              <a:t>9/8/2023</a:t>
             </a:fld>
             <a:endParaRPr lang="en-US"/>
           </a:p>
@@ -482,7 +490,7 @@
           <a:p>
             <a:fld id="{650E2452-111D-4323-B9CF-1B5500397756}" type="datetimeFigureOut">
               <a:rPr lang="en-US" smtClean="0"/>
-              <a:t>9/5/2023</a:t>
+              <a:t>9/8/2023</a:t>
             </a:fld>
             <a:endParaRPr lang="en-US"/>
           </a:p>
@@ -690,7 +698,7 @@
           <a:p>
             <a:fld id="{650E2452-111D-4323-B9CF-1B5500397756}" type="datetimeFigureOut">
               <a:rPr lang="en-US" smtClean="0"/>
-              <a:t>9/5/2023</a:t>
+              <a:t>9/8/2023</a:t>
             </a:fld>
             <a:endParaRPr lang="en-US"/>
           </a:p>
@@ -934,7 +942,7 @@
             <a:fld id="{650E2452-111D-4323-B9CF-1B5500397756}" type="datetimeFigureOut">
               <a:rPr lang="en-US" smtClean="0"/>
               <a:pPr/>
-              <a:t>9/5/2023</a:t>
+              <a:t>9/8/2023</a:t>
             </a:fld>
             <a:endParaRPr lang="en-US"/>
           </a:p>
@@ -1224,7 +1232,7 @@
           <a:p>
             <a:fld id="{650E2452-111D-4323-B9CF-1B5500397756}" type="datetimeFigureOut">
               <a:rPr lang="en-US" smtClean="0"/>
-              <a:t>9/5/2023</a:t>
+              <a:t>9/8/2023</a:t>
             </a:fld>
             <a:endParaRPr lang="en-US"/>
           </a:p>
@@ -1489,7 +1497,7 @@
           <a:p>
             <a:fld id="{650E2452-111D-4323-B9CF-1B5500397756}" type="datetimeFigureOut">
               <a:rPr lang="en-US" smtClean="0"/>
-              <a:t>9/5/2023</a:t>
+              <a:t>9/8/2023</a:t>
             </a:fld>
             <a:endParaRPr lang="en-US"/>
           </a:p>
@@ -1901,7 +1909,7 @@
           <a:p>
             <a:fld id="{650E2452-111D-4323-B9CF-1B5500397756}" type="datetimeFigureOut">
               <a:rPr lang="en-US" smtClean="0"/>
-              <a:t>9/5/2023</a:t>
+              <a:t>9/8/2023</a:t>
             </a:fld>
             <a:endParaRPr lang="en-US"/>
           </a:p>
@@ -2042,7 +2050,7 @@
           <a:p>
             <a:fld id="{650E2452-111D-4323-B9CF-1B5500397756}" type="datetimeFigureOut">
               <a:rPr lang="en-US" smtClean="0"/>
-              <a:t>9/5/2023</a:t>
+              <a:t>9/8/2023</a:t>
             </a:fld>
             <a:endParaRPr lang="en-US"/>
           </a:p>
@@ -2155,7 +2163,7 @@
           <a:p>
             <a:fld id="{650E2452-111D-4323-B9CF-1B5500397756}" type="datetimeFigureOut">
               <a:rPr lang="en-US" smtClean="0"/>
-              <a:t>9/5/2023</a:t>
+              <a:t>9/8/2023</a:t>
             </a:fld>
             <a:endParaRPr lang="en-US"/>
           </a:p>
@@ -2466,7 +2474,7 @@
           <a:p>
             <a:fld id="{650E2452-111D-4323-B9CF-1B5500397756}" type="datetimeFigureOut">
               <a:rPr lang="en-US" smtClean="0"/>
-              <a:t>9/5/2023</a:t>
+              <a:t>9/8/2023</a:t>
             </a:fld>
             <a:endParaRPr lang="en-US"/>
           </a:p>
@@ -2754,7 +2762,7 @@
           <a:p>
             <a:fld id="{650E2452-111D-4323-B9CF-1B5500397756}" type="datetimeFigureOut">
               <a:rPr lang="en-US" smtClean="0"/>
-              <a:t>9/5/2023</a:t>
+              <a:t>9/8/2023</a:t>
             </a:fld>
             <a:endParaRPr lang="en-US"/>
           </a:p>
@@ -2995,7 +3003,7 @@
           <a:p>
             <a:fld id="{650E2452-111D-4323-B9CF-1B5500397756}" type="datetimeFigureOut">
               <a:rPr lang="en-US" smtClean="0"/>
-              <a:t>9/5/2023</a:t>
+              <a:t>9/8/2023</a:t>
             </a:fld>
             <a:endParaRPr lang="en-US"/>
           </a:p>
@@ -3831,6 +3839,798 @@
 </p:sld>
 </file>
 
+<file path=ppt/slides/slide3.xml><?xml version="1.0" encoding="utf-8"?>
+<p:sld xmlns:a="http://schemas.openxmlformats.org/drawingml/2006/main" xmlns:r="http://schemas.openxmlformats.org/officeDocument/2006/relationships" xmlns:p="http://schemas.openxmlformats.org/presentationml/2006/main">
+  <p:cSld>
+    <p:spTree>
+      <p:nvGrpSpPr>
+        <p:cNvPr id="1" name=""/>
+        <p:cNvGrpSpPr/>
+        <p:nvPr/>
+      </p:nvGrpSpPr>
+      <p:grpSpPr>
+        <a:xfrm>
+          <a:off x="0" y="0"/>
+          <a:ext cx="0" cy="0"/>
+          <a:chOff x="0" y="0"/>
+          <a:chExt cx="0" cy="0"/>
+        </a:xfrm>
+      </p:grpSpPr>
+      <p:pic>
+        <p:nvPicPr>
+          <p:cNvPr id="10" name="Picture 9">
+            <a:extLst>
+              <a:ext uri="{FF2B5EF4-FFF2-40B4-BE49-F238E27FC236}">
+                <a16:creationId xmlns:a16="http://schemas.microsoft.com/office/drawing/2014/main" id="{FCD4F3C7-BB0B-D007-767A-FB3BFD107E3C}"/>
+              </a:ext>
+            </a:extLst>
+          </p:cNvPr>
+          <p:cNvPicPr>
+            <a:picLocks noChangeAspect="1"/>
+          </p:cNvPicPr>
+          <p:nvPr/>
+        </p:nvPicPr>
+        <p:blipFill>
+          <a:blip r:embed="rId2">
+            <a:extLst>
+              <a:ext uri="{28A0092B-C50C-407E-A947-70E740481C1C}">
+                <a14:useLocalDpi xmlns:a14="http://schemas.microsoft.com/office/drawing/2010/main" val="0"/>
+              </a:ext>
+            </a:extLst>
+          </a:blip>
+          <a:stretch>
+            <a:fillRect/>
+          </a:stretch>
+        </p:blipFill>
+        <p:spPr>
+          <a:xfrm>
+            <a:off x="3111749" y="1551269"/>
+            <a:ext cx="5968501" cy="3755461"/>
+          </a:xfrm>
+          <a:prstGeom prst="rect">
+            <a:avLst/>
+          </a:prstGeom>
+        </p:spPr>
+      </p:pic>
+      <p:grpSp>
+        <p:nvGrpSpPr>
+          <p:cNvPr id="14" name="Group 13">
+            <a:extLst>
+              <a:ext uri="{FF2B5EF4-FFF2-40B4-BE49-F238E27FC236}">
+                <a16:creationId xmlns:a16="http://schemas.microsoft.com/office/drawing/2014/main" id="{FD9A3A3D-72A8-EE93-DEAF-9E782D650173}"/>
+              </a:ext>
+            </a:extLst>
+          </p:cNvPr>
+          <p:cNvGrpSpPr/>
+          <p:nvPr/>
+        </p:nvGrpSpPr>
+        <p:grpSpPr>
+          <a:xfrm>
+            <a:off x="5184743" y="4060595"/>
+            <a:ext cx="369333" cy="369333"/>
+            <a:chOff x="669303" y="2386385"/>
+            <a:chExt cx="369333" cy="369333"/>
+          </a:xfrm>
+        </p:grpSpPr>
+        <p:sp>
+          <p:nvSpPr>
+            <p:cNvPr id="13" name="Oval 12">
+              <a:extLst>
+                <a:ext uri="{FF2B5EF4-FFF2-40B4-BE49-F238E27FC236}">
+                  <a16:creationId xmlns:a16="http://schemas.microsoft.com/office/drawing/2014/main" id="{627E999A-A818-6739-69C0-025C0A5E18E6}"/>
+                </a:ext>
+              </a:extLst>
+            </p:cNvPr>
+            <p:cNvSpPr/>
+            <p:nvPr/>
+          </p:nvSpPr>
+          <p:spPr>
+            <a:xfrm>
+              <a:off x="669303" y="2386385"/>
+              <a:ext cx="369333" cy="369333"/>
+            </a:xfrm>
+            <a:prstGeom prst="ellipse">
+              <a:avLst/>
+            </a:prstGeom>
+            <a:noFill/>
+            <a:ln>
+              <a:solidFill>
+                <a:schemeClr val="tx1"/>
+              </a:solidFill>
+            </a:ln>
+          </p:spPr>
+          <p:style>
+            <a:lnRef idx="2">
+              <a:schemeClr val="accent1">
+                <a:shade val="15000"/>
+              </a:schemeClr>
+            </a:lnRef>
+            <a:fillRef idx="1">
+              <a:schemeClr val="accent1"/>
+            </a:fillRef>
+            <a:effectRef idx="0">
+              <a:schemeClr val="accent1"/>
+            </a:effectRef>
+            <a:fontRef idx="minor">
+              <a:schemeClr val="lt1"/>
+            </a:fontRef>
+          </p:style>
+          <p:txBody>
+            <a:bodyPr rtlCol="0" anchor="ctr"/>
+            <a:lstStyle/>
+            <a:p>
+              <a:pPr algn="ctr"/>
+              <a:endParaRPr lang="en-US"/>
+            </a:p>
+          </p:txBody>
+        </p:sp>
+        <p:sp>
+          <p:nvSpPr>
+            <p:cNvPr id="11" name="TextBox 10">
+              <a:extLst>
+                <a:ext uri="{FF2B5EF4-FFF2-40B4-BE49-F238E27FC236}">
+                  <a16:creationId xmlns:a16="http://schemas.microsoft.com/office/drawing/2014/main" id="{9A2AAB81-B795-4D91-1666-EC251C1EF682}"/>
+                </a:ext>
+              </a:extLst>
+            </p:cNvPr>
+            <p:cNvSpPr txBox="1"/>
+            <p:nvPr/>
+          </p:nvSpPr>
+          <p:spPr>
+            <a:xfrm>
+              <a:off x="697516" y="2386386"/>
+              <a:ext cx="312906" cy="369332"/>
+            </a:xfrm>
+            <a:prstGeom prst="rect">
+              <a:avLst/>
+            </a:prstGeom>
+            <a:noFill/>
+          </p:spPr>
+          <p:txBody>
+            <a:bodyPr wrap="none" rtlCol="0">
+              <a:spAutoFit/>
+            </a:bodyPr>
+            <a:lstStyle/>
+            <a:p>
+              <a:r>
+                <a:rPr lang="en-US" dirty="0">
+                  <a:solidFill>
+                    <a:srgbClr val="FF0000"/>
+                  </a:solidFill>
+                  <a:latin typeface="Arial" panose="020B0604020202020204" pitchFamily="34" charset="0"/>
+                  <a:cs typeface="Arial" panose="020B0604020202020204" pitchFamily="34" charset="0"/>
+                </a:rPr>
+                <a:t>1</a:t>
+              </a:r>
+            </a:p>
+          </p:txBody>
+        </p:sp>
+      </p:grpSp>
+      <p:sp>
+        <p:nvSpPr>
+          <p:cNvPr id="15" name="TextBox 14">
+            <a:extLst>
+              <a:ext uri="{FF2B5EF4-FFF2-40B4-BE49-F238E27FC236}">
+                <a16:creationId xmlns:a16="http://schemas.microsoft.com/office/drawing/2014/main" id="{8C9A7220-0D98-3119-D516-3F498EEF123B}"/>
+              </a:ext>
+            </a:extLst>
+          </p:cNvPr>
+          <p:cNvSpPr txBox="1"/>
+          <p:nvPr/>
+        </p:nvSpPr>
+        <p:spPr>
+          <a:xfrm>
+            <a:off x="1310326" y="367645"/>
+            <a:ext cx="928459" cy="369332"/>
+          </a:xfrm>
+          <a:prstGeom prst="rect">
+            <a:avLst/>
+          </a:prstGeom>
+          <a:noFill/>
+        </p:spPr>
+        <p:txBody>
+          <a:bodyPr wrap="none" rtlCol="0">
+            <a:spAutoFit/>
+          </a:bodyPr>
+          <a:lstStyle/>
+          <a:p>
+            <a:pPr algn="l"/>
+            <a:r>
+              <a:rPr lang="en-US" dirty="0">
+                <a:latin typeface="Arial" panose="020B0604020202020204" pitchFamily="34" charset="0"/>
+                <a:cs typeface="Arial" panose="020B0604020202020204" pitchFamily="34" charset="0"/>
+              </a:rPr>
+              <a:t>Control</a:t>
+            </a:r>
+          </a:p>
+        </p:txBody>
+      </p:sp>
+      <p:grpSp>
+        <p:nvGrpSpPr>
+          <p:cNvPr id="2" name="Group 1">
+            <a:extLst>
+              <a:ext uri="{FF2B5EF4-FFF2-40B4-BE49-F238E27FC236}">
+                <a16:creationId xmlns:a16="http://schemas.microsoft.com/office/drawing/2014/main" id="{0E9BBAFE-6A2C-B8E1-EBBC-9FD8A5528C28}"/>
+              </a:ext>
+            </a:extLst>
+          </p:cNvPr>
+          <p:cNvGrpSpPr/>
+          <p:nvPr/>
+        </p:nvGrpSpPr>
+        <p:grpSpPr>
+          <a:xfrm>
+            <a:off x="7722124" y="3534265"/>
+            <a:ext cx="369333" cy="369333"/>
+            <a:chOff x="669303" y="2386385"/>
+            <a:chExt cx="369333" cy="369333"/>
+          </a:xfrm>
+        </p:grpSpPr>
+        <p:sp>
+          <p:nvSpPr>
+            <p:cNvPr id="3" name="Oval 2">
+              <a:extLst>
+                <a:ext uri="{FF2B5EF4-FFF2-40B4-BE49-F238E27FC236}">
+                  <a16:creationId xmlns:a16="http://schemas.microsoft.com/office/drawing/2014/main" id="{EFB729EA-DA7E-A094-CC9B-05E4D7734C5F}"/>
+                </a:ext>
+              </a:extLst>
+            </p:cNvPr>
+            <p:cNvSpPr/>
+            <p:nvPr/>
+          </p:nvSpPr>
+          <p:spPr>
+            <a:xfrm>
+              <a:off x="669303" y="2386385"/>
+              <a:ext cx="369333" cy="369333"/>
+            </a:xfrm>
+            <a:prstGeom prst="ellipse">
+              <a:avLst/>
+            </a:prstGeom>
+            <a:noFill/>
+            <a:ln>
+              <a:solidFill>
+                <a:schemeClr val="tx1"/>
+              </a:solidFill>
+            </a:ln>
+          </p:spPr>
+          <p:style>
+            <a:lnRef idx="2">
+              <a:schemeClr val="accent1">
+                <a:shade val="15000"/>
+              </a:schemeClr>
+            </a:lnRef>
+            <a:fillRef idx="1">
+              <a:schemeClr val="accent1"/>
+            </a:fillRef>
+            <a:effectRef idx="0">
+              <a:schemeClr val="accent1"/>
+            </a:effectRef>
+            <a:fontRef idx="minor">
+              <a:schemeClr val="lt1"/>
+            </a:fontRef>
+          </p:style>
+          <p:txBody>
+            <a:bodyPr rtlCol="0" anchor="ctr"/>
+            <a:lstStyle/>
+            <a:p>
+              <a:pPr algn="ctr"/>
+              <a:endParaRPr lang="en-US"/>
+            </a:p>
+          </p:txBody>
+        </p:sp>
+        <p:sp>
+          <p:nvSpPr>
+            <p:cNvPr id="4" name="TextBox 3">
+              <a:extLst>
+                <a:ext uri="{FF2B5EF4-FFF2-40B4-BE49-F238E27FC236}">
+                  <a16:creationId xmlns:a16="http://schemas.microsoft.com/office/drawing/2014/main" id="{6F873F19-7933-9C44-F25C-8840C65F498A}"/>
+                </a:ext>
+              </a:extLst>
+            </p:cNvPr>
+            <p:cNvSpPr txBox="1"/>
+            <p:nvPr/>
+          </p:nvSpPr>
+          <p:spPr>
+            <a:xfrm>
+              <a:off x="697516" y="2386386"/>
+              <a:ext cx="312906" cy="369332"/>
+            </a:xfrm>
+            <a:prstGeom prst="rect">
+              <a:avLst/>
+            </a:prstGeom>
+            <a:noFill/>
+          </p:spPr>
+          <p:txBody>
+            <a:bodyPr wrap="none" rtlCol="0">
+              <a:spAutoFit/>
+            </a:bodyPr>
+            <a:lstStyle/>
+            <a:p>
+              <a:r>
+                <a:rPr lang="en-US" dirty="0">
+                  <a:solidFill>
+                    <a:srgbClr val="FF0000"/>
+                  </a:solidFill>
+                  <a:latin typeface="Arial" panose="020B0604020202020204" pitchFamily="34" charset="0"/>
+                  <a:cs typeface="Arial" panose="020B0604020202020204" pitchFamily="34" charset="0"/>
+                </a:rPr>
+                <a:t>2</a:t>
+              </a:r>
+            </a:p>
+          </p:txBody>
+        </p:sp>
+      </p:grpSp>
+    </p:spTree>
+    <p:extLst>
+      <p:ext uri="{BB962C8B-B14F-4D97-AF65-F5344CB8AC3E}">
+        <p14:creationId xmlns:p14="http://schemas.microsoft.com/office/powerpoint/2010/main" val="153352087"/>
+      </p:ext>
+    </p:extLst>
+  </p:cSld>
+  <p:clrMapOvr>
+    <a:masterClrMapping/>
+  </p:clrMapOvr>
+</p:sld>
+</file>
+
+<file path=ppt/slides/slide4.xml><?xml version="1.0" encoding="utf-8"?>
+<p:sld xmlns:a="http://schemas.openxmlformats.org/drawingml/2006/main" xmlns:r="http://schemas.openxmlformats.org/officeDocument/2006/relationships" xmlns:p="http://schemas.openxmlformats.org/presentationml/2006/main">
+  <p:cSld>
+    <p:spTree>
+      <p:nvGrpSpPr>
+        <p:cNvPr id="1" name=""/>
+        <p:cNvGrpSpPr/>
+        <p:nvPr/>
+      </p:nvGrpSpPr>
+      <p:grpSpPr>
+        <a:xfrm>
+          <a:off x="0" y="0"/>
+          <a:ext cx="0" cy="0"/>
+          <a:chOff x="0" y="0"/>
+          <a:chExt cx="0" cy="0"/>
+        </a:xfrm>
+      </p:grpSpPr>
+      <p:pic>
+        <p:nvPicPr>
+          <p:cNvPr id="4" name="Picture 3">
+            <a:extLst>
+              <a:ext uri="{FF2B5EF4-FFF2-40B4-BE49-F238E27FC236}">
+                <a16:creationId xmlns:a16="http://schemas.microsoft.com/office/drawing/2014/main" id="{E545F5BD-B570-53B2-FAFE-904973763537}"/>
+              </a:ext>
+            </a:extLst>
+          </p:cNvPr>
+          <p:cNvPicPr>
+            <a:picLocks noChangeAspect="1"/>
+          </p:cNvPicPr>
+          <p:nvPr/>
+        </p:nvPicPr>
+        <p:blipFill>
+          <a:blip r:embed="rId2">
+            <a:extLst>
+              <a:ext uri="{28A0092B-C50C-407E-A947-70E740481C1C}">
+                <a14:useLocalDpi xmlns:a14="http://schemas.microsoft.com/office/drawing/2010/main" val="0"/>
+              </a:ext>
+            </a:extLst>
+          </a:blip>
+          <a:stretch>
+            <a:fillRect/>
+          </a:stretch>
+        </p:blipFill>
+        <p:spPr>
+          <a:xfrm>
+            <a:off x="3111749" y="1551269"/>
+            <a:ext cx="5968501" cy="3755461"/>
+          </a:xfrm>
+          <a:prstGeom prst="rect">
+            <a:avLst/>
+          </a:prstGeom>
+        </p:spPr>
+      </p:pic>
+      <p:pic>
+        <p:nvPicPr>
+          <p:cNvPr id="6" name="Picture 5">
+            <a:extLst>
+              <a:ext uri="{FF2B5EF4-FFF2-40B4-BE49-F238E27FC236}">
+                <a16:creationId xmlns:a16="http://schemas.microsoft.com/office/drawing/2014/main" id="{0356A8B0-7B93-A19A-774B-8E4C10CE7C87}"/>
+              </a:ext>
+            </a:extLst>
+          </p:cNvPr>
+          <p:cNvPicPr>
+            <a:picLocks noChangeAspect="1"/>
+          </p:cNvPicPr>
+          <p:nvPr/>
+        </p:nvPicPr>
+        <p:blipFill>
+          <a:blip r:embed="rId3"/>
+          <a:stretch>
+            <a:fillRect/>
+          </a:stretch>
+        </p:blipFill>
+        <p:spPr>
+          <a:xfrm>
+            <a:off x="3111749" y="2404207"/>
+            <a:ext cx="5968501" cy="2430497"/>
+          </a:xfrm>
+          <a:prstGeom prst="rect">
+            <a:avLst/>
+          </a:prstGeom>
+        </p:spPr>
+      </p:pic>
+      <p:grpSp>
+        <p:nvGrpSpPr>
+          <p:cNvPr id="2" name="Group 1">
+            <a:extLst>
+              <a:ext uri="{FF2B5EF4-FFF2-40B4-BE49-F238E27FC236}">
+                <a16:creationId xmlns:a16="http://schemas.microsoft.com/office/drawing/2014/main" id="{E2AA1008-5B2D-C5DD-8AB6-6C79ED3DF785}"/>
+              </a:ext>
+            </a:extLst>
+          </p:cNvPr>
+          <p:cNvGrpSpPr/>
+          <p:nvPr/>
+        </p:nvGrpSpPr>
+        <p:grpSpPr>
+          <a:xfrm>
+            <a:off x="5911332" y="5427482"/>
+            <a:ext cx="369333" cy="369333"/>
+            <a:chOff x="669303" y="2386385"/>
+            <a:chExt cx="369333" cy="369333"/>
+          </a:xfrm>
+        </p:grpSpPr>
+        <p:sp>
+          <p:nvSpPr>
+            <p:cNvPr id="3" name="Oval 2">
+              <a:extLst>
+                <a:ext uri="{FF2B5EF4-FFF2-40B4-BE49-F238E27FC236}">
+                  <a16:creationId xmlns:a16="http://schemas.microsoft.com/office/drawing/2014/main" id="{93DF2628-BA49-728A-B4F6-8FF0B7E2CF7E}"/>
+                </a:ext>
+              </a:extLst>
+            </p:cNvPr>
+            <p:cNvSpPr/>
+            <p:nvPr/>
+          </p:nvSpPr>
+          <p:spPr>
+            <a:xfrm>
+              <a:off x="669303" y="2386385"/>
+              <a:ext cx="369333" cy="369333"/>
+            </a:xfrm>
+            <a:prstGeom prst="ellipse">
+              <a:avLst/>
+            </a:prstGeom>
+            <a:noFill/>
+            <a:ln>
+              <a:solidFill>
+                <a:schemeClr val="tx1"/>
+              </a:solidFill>
+            </a:ln>
+          </p:spPr>
+          <p:style>
+            <a:lnRef idx="2">
+              <a:schemeClr val="accent1">
+                <a:shade val="15000"/>
+              </a:schemeClr>
+            </a:lnRef>
+            <a:fillRef idx="1">
+              <a:schemeClr val="accent1"/>
+            </a:fillRef>
+            <a:effectRef idx="0">
+              <a:schemeClr val="accent1"/>
+            </a:effectRef>
+            <a:fontRef idx="minor">
+              <a:schemeClr val="lt1"/>
+            </a:fontRef>
+          </p:style>
+          <p:txBody>
+            <a:bodyPr rtlCol="0" anchor="ctr"/>
+            <a:lstStyle/>
+            <a:p>
+              <a:pPr algn="ctr"/>
+              <a:endParaRPr lang="en-US"/>
+            </a:p>
+          </p:txBody>
+        </p:sp>
+        <p:sp>
+          <p:nvSpPr>
+            <p:cNvPr id="5" name="TextBox 4">
+              <a:extLst>
+                <a:ext uri="{FF2B5EF4-FFF2-40B4-BE49-F238E27FC236}">
+                  <a16:creationId xmlns:a16="http://schemas.microsoft.com/office/drawing/2014/main" id="{E6273096-B6BC-24BE-F921-A2A34DC01FC5}"/>
+                </a:ext>
+              </a:extLst>
+            </p:cNvPr>
+            <p:cNvSpPr txBox="1"/>
+            <p:nvPr/>
+          </p:nvSpPr>
+          <p:spPr>
+            <a:xfrm>
+              <a:off x="697516" y="2386386"/>
+              <a:ext cx="312906" cy="369332"/>
+            </a:xfrm>
+            <a:prstGeom prst="rect">
+              <a:avLst/>
+            </a:prstGeom>
+            <a:noFill/>
+          </p:spPr>
+          <p:txBody>
+            <a:bodyPr wrap="none" rtlCol="0">
+              <a:spAutoFit/>
+            </a:bodyPr>
+            <a:lstStyle/>
+            <a:p>
+              <a:r>
+                <a:rPr lang="en-US" dirty="0">
+                  <a:solidFill>
+                    <a:srgbClr val="FF0000"/>
+                  </a:solidFill>
+                  <a:latin typeface="Arial" panose="020B0604020202020204" pitchFamily="34" charset="0"/>
+                  <a:cs typeface="Arial" panose="020B0604020202020204" pitchFamily="34" charset="0"/>
+                </a:rPr>
+                <a:t>2</a:t>
+              </a:r>
+            </a:p>
+          </p:txBody>
+        </p:sp>
+      </p:grpSp>
+    </p:spTree>
+    <p:extLst>
+      <p:ext uri="{BB962C8B-B14F-4D97-AF65-F5344CB8AC3E}">
+        <p14:creationId xmlns:p14="http://schemas.microsoft.com/office/powerpoint/2010/main" val="1266853364"/>
+      </p:ext>
+    </p:extLst>
+  </p:cSld>
+  <p:clrMapOvr>
+    <a:masterClrMapping/>
+  </p:clrMapOvr>
+</p:sld>
+</file>
+
+<file path=ppt/slides/slide5.xml><?xml version="1.0" encoding="utf-8"?>
+<p:sld xmlns:a="http://schemas.openxmlformats.org/drawingml/2006/main" xmlns:r="http://schemas.openxmlformats.org/officeDocument/2006/relationships" xmlns:p="http://schemas.openxmlformats.org/presentationml/2006/main">
+  <p:cSld>
+    <p:spTree>
+      <p:nvGrpSpPr>
+        <p:cNvPr id="1" name=""/>
+        <p:cNvGrpSpPr/>
+        <p:nvPr/>
+      </p:nvGrpSpPr>
+      <p:grpSpPr>
+        <a:xfrm>
+          <a:off x="0" y="0"/>
+          <a:ext cx="0" cy="0"/>
+          <a:chOff x="0" y="0"/>
+          <a:chExt cx="0" cy="0"/>
+        </a:xfrm>
+      </p:grpSpPr>
+      <p:pic>
+        <p:nvPicPr>
+          <p:cNvPr id="4" name="Picture 3">
+            <a:extLst>
+              <a:ext uri="{FF2B5EF4-FFF2-40B4-BE49-F238E27FC236}">
+                <a16:creationId xmlns:a16="http://schemas.microsoft.com/office/drawing/2014/main" id="{584D14DE-83F9-5DF3-9B65-85CC5C48C8AF}"/>
+              </a:ext>
+            </a:extLst>
+          </p:cNvPr>
+          <p:cNvPicPr>
+            <a:picLocks noChangeAspect="1"/>
+          </p:cNvPicPr>
+          <p:nvPr/>
+        </p:nvPicPr>
+        <p:blipFill>
+          <a:blip r:embed="rId2">
+            <a:extLst>
+              <a:ext uri="{28A0092B-C50C-407E-A947-70E740481C1C}">
+                <a14:useLocalDpi xmlns:a14="http://schemas.microsoft.com/office/drawing/2010/main" val="0"/>
+              </a:ext>
+            </a:extLst>
+          </a:blip>
+          <a:stretch>
+            <a:fillRect/>
+          </a:stretch>
+        </p:blipFill>
+        <p:spPr>
+          <a:xfrm>
+            <a:off x="3111749" y="1551269"/>
+            <a:ext cx="5968501" cy="3755461"/>
+          </a:xfrm>
+          <a:prstGeom prst="rect">
+            <a:avLst/>
+          </a:prstGeom>
+        </p:spPr>
+      </p:pic>
+      <p:pic>
+        <p:nvPicPr>
+          <p:cNvPr id="6" name="Picture 5">
+            <a:extLst>
+              <a:ext uri="{FF2B5EF4-FFF2-40B4-BE49-F238E27FC236}">
+                <a16:creationId xmlns:a16="http://schemas.microsoft.com/office/drawing/2014/main" id="{39FCE035-0315-2346-D9D5-E65250E6FE9F}"/>
+              </a:ext>
+            </a:extLst>
+          </p:cNvPr>
+          <p:cNvPicPr>
+            <a:picLocks noChangeAspect="1"/>
+          </p:cNvPicPr>
+          <p:nvPr/>
+        </p:nvPicPr>
+        <p:blipFill>
+          <a:blip r:embed="rId3"/>
+          <a:stretch>
+            <a:fillRect/>
+          </a:stretch>
+        </p:blipFill>
+        <p:spPr>
+          <a:xfrm>
+            <a:off x="3111749" y="2409904"/>
+            <a:ext cx="5968501" cy="2412373"/>
+          </a:xfrm>
+          <a:prstGeom prst="rect">
+            <a:avLst/>
+          </a:prstGeom>
+        </p:spPr>
+      </p:pic>
+      <p:sp>
+        <p:nvSpPr>
+          <p:cNvPr id="8" name="TextBox 7">
+            <a:extLst>
+              <a:ext uri="{FF2B5EF4-FFF2-40B4-BE49-F238E27FC236}">
+                <a16:creationId xmlns:a16="http://schemas.microsoft.com/office/drawing/2014/main" id="{4B9173DD-AC3C-5B04-D500-3F6E93F51848}"/>
+              </a:ext>
+            </a:extLst>
+          </p:cNvPr>
+          <p:cNvSpPr txBox="1"/>
+          <p:nvPr/>
+        </p:nvSpPr>
+        <p:spPr>
+          <a:xfrm>
+            <a:off x="1310326" y="367645"/>
+            <a:ext cx="838691" cy="369332"/>
+          </a:xfrm>
+          <a:prstGeom prst="rect">
+            <a:avLst/>
+          </a:prstGeom>
+          <a:noFill/>
+        </p:spPr>
+        <p:txBody>
+          <a:bodyPr wrap="none" rtlCol="0">
+            <a:spAutoFit/>
+          </a:bodyPr>
+          <a:lstStyle/>
+          <a:p>
+            <a:pPr algn="l"/>
+            <a:r>
+              <a:rPr lang="en-US" dirty="0">
+                <a:latin typeface="Arial" panose="020B0604020202020204" pitchFamily="34" charset="0"/>
+                <a:cs typeface="Arial" panose="020B0604020202020204" pitchFamily="34" charset="0"/>
+              </a:rPr>
+              <a:t>Safety</a:t>
+            </a:r>
+          </a:p>
+        </p:txBody>
+      </p:sp>
+      <p:grpSp>
+        <p:nvGrpSpPr>
+          <p:cNvPr id="9" name="Group 8">
+            <a:extLst>
+              <a:ext uri="{FF2B5EF4-FFF2-40B4-BE49-F238E27FC236}">
+                <a16:creationId xmlns:a16="http://schemas.microsoft.com/office/drawing/2014/main" id="{58DBF5F3-276F-6A74-7334-1C5EA52BA949}"/>
+              </a:ext>
+            </a:extLst>
+          </p:cNvPr>
+          <p:cNvGrpSpPr/>
+          <p:nvPr/>
+        </p:nvGrpSpPr>
+        <p:grpSpPr>
+          <a:xfrm>
+            <a:off x="5911332" y="5496245"/>
+            <a:ext cx="369333" cy="369333"/>
+            <a:chOff x="669303" y="2386385"/>
+            <a:chExt cx="369333" cy="369333"/>
+          </a:xfrm>
+        </p:grpSpPr>
+        <p:sp>
+          <p:nvSpPr>
+            <p:cNvPr id="10" name="Oval 9">
+              <a:extLst>
+                <a:ext uri="{FF2B5EF4-FFF2-40B4-BE49-F238E27FC236}">
+                  <a16:creationId xmlns:a16="http://schemas.microsoft.com/office/drawing/2014/main" id="{C0511537-7E79-B446-9955-E92514CCA296}"/>
+                </a:ext>
+              </a:extLst>
+            </p:cNvPr>
+            <p:cNvSpPr/>
+            <p:nvPr/>
+          </p:nvSpPr>
+          <p:spPr>
+            <a:xfrm>
+              <a:off x="669303" y="2386385"/>
+              <a:ext cx="369333" cy="369333"/>
+            </a:xfrm>
+            <a:prstGeom prst="ellipse">
+              <a:avLst/>
+            </a:prstGeom>
+            <a:noFill/>
+            <a:ln>
+              <a:solidFill>
+                <a:schemeClr val="tx1"/>
+              </a:solidFill>
+            </a:ln>
+          </p:spPr>
+          <p:style>
+            <a:lnRef idx="2">
+              <a:schemeClr val="accent1">
+                <a:shade val="15000"/>
+              </a:schemeClr>
+            </a:lnRef>
+            <a:fillRef idx="1">
+              <a:schemeClr val="accent1"/>
+            </a:fillRef>
+            <a:effectRef idx="0">
+              <a:schemeClr val="accent1"/>
+            </a:effectRef>
+            <a:fontRef idx="minor">
+              <a:schemeClr val="lt1"/>
+            </a:fontRef>
+          </p:style>
+          <p:txBody>
+            <a:bodyPr rtlCol="0" anchor="ctr"/>
+            <a:lstStyle/>
+            <a:p>
+              <a:pPr algn="ctr"/>
+              <a:endParaRPr lang="en-US"/>
+            </a:p>
+          </p:txBody>
+        </p:sp>
+        <p:sp>
+          <p:nvSpPr>
+            <p:cNvPr id="11" name="TextBox 10">
+              <a:extLst>
+                <a:ext uri="{FF2B5EF4-FFF2-40B4-BE49-F238E27FC236}">
+                  <a16:creationId xmlns:a16="http://schemas.microsoft.com/office/drawing/2014/main" id="{BF61EC8B-5E77-8C73-83C4-34BF3B5D850A}"/>
+                </a:ext>
+              </a:extLst>
+            </p:cNvPr>
+            <p:cNvSpPr txBox="1"/>
+            <p:nvPr/>
+          </p:nvSpPr>
+          <p:spPr>
+            <a:xfrm>
+              <a:off x="697516" y="2386386"/>
+              <a:ext cx="312906" cy="369332"/>
+            </a:xfrm>
+            <a:prstGeom prst="rect">
+              <a:avLst/>
+            </a:prstGeom>
+            <a:noFill/>
+          </p:spPr>
+          <p:txBody>
+            <a:bodyPr wrap="none" rtlCol="0">
+              <a:spAutoFit/>
+            </a:bodyPr>
+            <a:lstStyle/>
+            <a:p>
+              <a:r>
+                <a:rPr lang="en-US" dirty="0">
+                  <a:solidFill>
+                    <a:srgbClr val="FF0000"/>
+                  </a:solidFill>
+                  <a:latin typeface="Arial" panose="020B0604020202020204" pitchFamily="34" charset="0"/>
+                  <a:cs typeface="Arial" panose="020B0604020202020204" pitchFamily="34" charset="0"/>
+                </a:rPr>
+                <a:t>1</a:t>
+              </a:r>
+            </a:p>
+          </p:txBody>
+        </p:sp>
+      </p:grpSp>
+    </p:spTree>
+    <p:extLst>
+      <p:ext uri="{BB962C8B-B14F-4D97-AF65-F5344CB8AC3E}">
+        <p14:creationId xmlns:p14="http://schemas.microsoft.com/office/powerpoint/2010/main" val="27916610"/>
+      </p:ext>
+    </p:extLst>
+  </p:cSld>
+  <p:clrMapOvr>
+    <a:masterClrMapping/>
+  </p:clrMapOvr>
+</p:sld>
+</file>
+
 <file path=ppt/theme/theme1.xml><?xml version="1.0" encoding="utf-8"?>
 <a:theme xmlns:a="http://schemas.openxmlformats.org/drawingml/2006/main" name="Office Theme">
   <a:themeElements>
@@ -4116,7 +4916,24 @@
       </a:bgFillStyleLst>
     </a:fmtScheme>
   </a:themeElements>
-  <a:objectDefaults/>
+  <a:objectDefaults>
+    <a:txDef>
+      <a:spPr>
+        <a:noFill/>
+      </a:spPr>
+      <a:bodyPr wrap="none" rtlCol="0">
+        <a:spAutoFit/>
+      </a:bodyPr>
+      <a:lstStyle>
+        <a:defPPr algn="l">
+          <a:defRPr dirty="0" smtClean="0">
+            <a:latin typeface="Arial" panose="020B0604020202020204" pitchFamily="34" charset="0"/>
+            <a:cs typeface="Arial" panose="020B0604020202020204" pitchFamily="34" charset="0"/>
+          </a:defRPr>
+        </a:defPPr>
+      </a:lstStyle>
+    </a:txDef>
+  </a:objectDefaults>
   <a:extraClrSchemeLst/>
   <a:extLst>
     <a:ext uri="{05A4C25C-085E-4340-85A3-A5531E510DB2}">

</xml_diff>